<commit_message>
changes made, submitted to science office (3 weeks before defence)
</commit_message>
<xml_diff>
--- a/thesis/analysis/graphs/Xc.pptx
+++ b/thesis/analysis/graphs/Xc.pptx
@@ -104,6 +104,11 @@
       </a:defRPr>
     </a:lvl9pPr>
   </p:defaultTextStyle>
+  <p:extLst>
+    <p:ext uri="{EFAFB233-063F-42B5-8137-9DF3F51BA10A}">
+      <p15:sldGuideLst xmlns:p15="http://schemas.microsoft.com/office/powerpoint/2012/main"/>
+    </p:ext>
+  </p:extLst>
 </p:presentation>
 </file>
 
@@ -692,7 +697,7 @@
         </c:scaling>
         <c:delete val="0"/>
         <c:axPos val="l"/>
-        <c:numFmt formatCode="#\ ??/100" sourceLinked="1"/>
+        <c:numFmt formatCode="General" sourceLinked="0"/>
         <c:majorTickMark val="in"/>
         <c:minorTickMark val="none"/>
         <c:tickLblPos val="nextTo"/>
@@ -1708,7 +1713,7 @@
         </c:scaling>
         <c:delete val="0"/>
         <c:axPos val="l"/>
-        <c:numFmt formatCode="#\ ??/100" sourceLinked="1"/>
+        <c:numFmt formatCode="General" sourceLinked="0"/>
         <c:majorTickMark val="in"/>
         <c:minorTickMark val="none"/>
         <c:tickLblPos val="nextTo"/>
@@ -3075,7 +3080,7 @@
           <a:p>
             <a:fld id="{3C486352-6B4E-4843-8C77-57A7D9422E1B}" type="datetimeFigureOut">
               <a:rPr lang="en-US" smtClean="0"/>
-              <a:t>9/29/18</a:t>
+              <a:t>10/20/2018</a:t>
             </a:fld>
             <a:endParaRPr lang="en-US"/>
           </a:p>
@@ -3273,7 +3278,7 @@
           <a:p>
             <a:fld id="{3C486352-6B4E-4843-8C77-57A7D9422E1B}" type="datetimeFigureOut">
               <a:rPr lang="en-US" smtClean="0"/>
-              <a:t>9/29/18</a:t>
+              <a:t>10/20/2018</a:t>
             </a:fld>
             <a:endParaRPr lang="en-US"/>
           </a:p>
@@ -3481,7 +3486,7 @@
           <a:p>
             <a:fld id="{3C486352-6B4E-4843-8C77-57A7D9422E1B}" type="datetimeFigureOut">
               <a:rPr lang="en-US" smtClean="0"/>
-              <a:t>9/29/18</a:t>
+              <a:t>10/20/2018</a:t>
             </a:fld>
             <a:endParaRPr lang="en-US"/>
           </a:p>
@@ -3679,7 +3684,7 @@
           <a:p>
             <a:fld id="{3C486352-6B4E-4843-8C77-57A7D9422E1B}" type="datetimeFigureOut">
               <a:rPr lang="en-US" smtClean="0"/>
-              <a:t>9/29/18</a:t>
+              <a:t>10/20/2018</a:t>
             </a:fld>
             <a:endParaRPr lang="en-US"/>
           </a:p>
@@ -3954,7 +3959,7 @@
           <a:p>
             <a:fld id="{3C486352-6B4E-4843-8C77-57A7D9422E1B}" type="datetimeFigureOut">
               <a:rPr lang="en-US" smtClean="0"/>
-              <a:t>9/29/18</a:t>
+              <a:t>10/20/2018</a:t>
             </a:fld>
             <a:endParaRPr lang="en-US"/>
           </a:p>
@@ -4219,7 +4224,7 @@
           <a:p>
             <a:fld id="{3C486352-6B4E-4843-8C77-57A7D9422E1B}" type="datetimeFigureOut">
               <a:rPr lang="en-US" smtClean="0"/>
-              <a:t>9/29/18</a:t>
+              <a:t>10/20/2018</a:t>
             </a:fld>
             <a:endParaRPr lang="en-US"/>
           </a:p>
@@ -4631,7 +4636,7 @@
           <a:p>
             <a:fld id="{3C486352-6B4E-4843-8C77-57A7D9422E1B}" type="datetimeFigureOut">
               <a:rPr lang="en-US" smtClean="0"/>
-              <a:t>9/29/18</a:t>
+              <a:t>10/20/2018</a:t>
             </a:fld>
             <a:endParaRPr lang="en-US"/>
           </a:p>
@@ -4772,7 +4777,7 @@
           <a:p>
             <a:fld id="{3C486352-6B4E-4843-8C77-57A7D9422E1B}" type="datetimeFigureOut">
               <a:rPr lang="en-US" smtClean="0"/>
-              <a:t>9/29/18</a:t>
+              <a:t>10/20/2018</a:t>
             </a:fld>
             <a:endParaRPr lang="en-US"/>
           </a:p>
@@ -4885,7 +4890,7 @@
           <a:p>
             <a:fld id="{3C486352-6B4E-4843-8C77-57A7D9422E1B}" type="datetimeFigureOut">
               <a:rPr lang="en-US" smtClean="0"/>
-              <a:t>9/29/18</a:t>
+              <a:t>10/20/2018</a:t>
             </a:fld>
             <a:endParaRPr lang="en-US"/>
           </a:p>
@@ -5196,7 +5201,7 @@
           <a:p>
             <a:fld id="{3C486352-6B4E-4843-8C77-57A7D9422E1B}" type="datetimeFigureOut">
               <a:rPr lang="en-US" smtClean="0"/>
-              <a:t>9/29/18</a:t>
+              <a:t>10/20/2018</a:t>
             </a:fld>
             <a:endParaRPr lang="en-US"/>
           </a:p>
@@ -5484,7 +5489,7 @@
           <a:p>
             <a:fld id="{3C486352-6B4E-4843-8C77-57A7D9422E1B}" type="datetimeFigureOut">
               <a:rPr lang="en-US" smtClean="0"/>
-              <a:t>9/29/18</a:t>
+              <a:t>10/20/2018</a:t>
             </a:fld>
             <a:endParaRPr lang="en-US"/>
           </a:p>
@@ -5725,7 +5730,7 @@
           <a:p>
             <a:fld id="{3C486352-6B4E-4843-8C77-57A7D9422E1B}" type="datetimeFigureOut">
               <a:rPr lang="en-US" smtClean="0"/>
-              <a:t>9/29/18</a:t>
+              <a:t>10/20/2018</a:t>
             </a:fld>
             <a:endParaRPr lang="en-US"/>
           </a:p>
@@ -6235,13 +6240,13 @@
           <p:nvPr>
             <p:extLst>
               <p:ext uri="{D42A27DB-BD31-4B8C-83A1-F6EECF244321}">
-                <p14:modId xmlns:p14="http://schemas.microsoft.com/office/powerpoint/2010/main" val="1500646023"/>
+                <p14:modId xmlns:p14="http://schemas.microsoft.com/office/powerpoint/2010/main" val="2046221990"/>
               </p:ext>
             </p:extLst>
           </p:nvPr>
         </p:nvGraphicFramePr>
         <p:xfrm>
-          <a:off x="1575632" y="2536455"/>
+          <a:off x="839294" y="2500313"/>
           <a:ext cx="6026080" cy="3228976"/>
         </p:xfrm>
         <a:graphic>
@@ -6250,54 +6255,6 @@
           </a:graphicData>
         </a:graphic>
       </p:graphicFrame>
-      <p:sp>
-        <p:nvSpPr>
-          <p:cNvPr id="10" name="TextBox 9">
-            <a:extLst>
-              <a:ext uri="{FF2B5EF4-FFF2-40B4-BE49-F238E27FC236}">
-                <a16:creationId xmlns:a16="http://schemas.microsoft.com/office/drawing/2014/main" id="{9CA40C5D-245D-2846-8D5D-5F660FBE5FF9}"/>
-              </a:ext>
-            </a:extLst>
-          </p:cNvPr>
-          <p:cNvSpPr txBox="1"/>
-          <p:nvPr/>
-        </p:nvSpPr>
-        <p:spPr>
-          <a:xfrm>
-            <a:off x="3280836" y="4643437"/>
-            <a:ext cx="300082" cy="276999"/>
-          </a:xfrm>
-          <a:prstGeom prst="rect">
-            <a:avLst/>
-          </a:prstGeom>
-          <a:noFill/>
-        </p:spPr>
-        <p:txBody>
-          <a:bodyPr wrap="none" rtlCol="0">
-            <a:spAutoFit/>
-          </a:bodyPr>
-          <a:lstStyle/>
-          <a:p>
-            <a:pPr algn="ctr">
-              <a:defRPr lang="en-US" sz="1600" b="0" i="0" u="none" strike="noStrike" kern="1200" baseline="0">
-                <a:solidFill>
-                  <a:prstClr val="black"/>
-                </a:solidFill>
-                <a:latin typeface="+mn-lt"/>
-                <a:ea typeface="+mn-ea"/>
-                <a:cs typeface="+mn-cs"/>
-              </a:defRPr>
-            </a:pPr>
-            <a:r>
-              <a:rPr lang="en-US" sz="1200" dirty="0">
-                <a:latin typeface="MS Reference Sans Serif" panose="020B0604030504040204" pitchFamily="34" charset="0"/>
-              </a:rPr>
-              <a:t></a:t>
-            </a:r>
-            <a:endParaRPr lang="en-US" sz="1200" dirty="0"/>
-          </a:p>
-        </p:txBody>
-      </p:sp>
       <p:sp>
         <p:nvSpPr>
           <p:cNvPr id="11" name="TextBox 10">
@@ -6312,7 +6269,7 @@
         </p:nvSpPr>
         <p:spPr>
           <a:xfrm>
-            <a:off x="3852334" y="5744421"/>
+            <a:off x="2980754" y="5781466"/>
             <a:ext cx="300082" cy="276999"/>
           </a:xfrm>
           <a:prstGeom prst="rect">

</xml_diff>

<commit_message>
final version (as accepted by UWSpace)
</commit_message>
<xml_diff>
--- a/thesis/analysis/graphs/Xc.pptx
+++ b/thesis/analysis/graphs/Xc.pptx
@@ -3080,7 +3080,7 @@
           <a:p>
             <a:fld id="{3C486352-6B4E-4843-8C77-57A7D9422E1B}" type="datetimeFigureOut">
               <a:rPr lang="en-US" smtClean="0"/>
-              <a:t>10/20/2018</a:t>
+              <a:t>12/9/18</a:t>
             </a:fld>
             <a:endParaRPr lang="en-US"/>
           </a:p>
@@ -3278,7 +3278,7 @@
           <a:p>
             <a:fld id="{3C486352-6B4E-4843-8C77-57A7D9422E1B}" type="datetimeFigureOut">
               <a:rPr lang="en-US" smtClean="0"/>
-              <a:t>10/20/2018</a:t>
+              <a:t>12/9/18</a:t>
             </a:fld>
             <a:endParaRPr lang="en-US"/>
           </a:p>
@@ -3486,7 +3486,7 @@
           <a:p>
             <a:fld id="{3C486352-6B4E-4843-8C77-57A7D9422E1B}" type="datetimeFigureOut">
               <a:rPr lang="en-US" smtClean="0"/>
-              <a:t>10/20/2018</a:t>
+              <a:t>12/9/18</a:t>
             </a:fld>
             <a:endParaRPr lang="en-US"/>
           </a:p>
@@ -3684,7 +3684,7 @@
           <a:p>
             <a:fld id="{3C486352-6B4E-4843-8C77-57A7D9422E1B}" type="datetimeFigureOut">
               <a:rPr lang="en-US" smtClean="0"/>
-              <a:t>10/20/2018</a:t>
+              <a:t>12/9/18</a:t>
             </a:fld>
             <a:endParaRPr lang="en-US"/>
           </a:p>
@@ -3959,7 +3959,7 @@
           <a:p>
             <a:fld id="{3C486352-6B4E-4843-8C77-57A7D9422E1B}" type="datetimeFigureOut">
               <a:rPr lang="en-US" smtClean="0"/>
-              <a:t>10/20/2018</a:t>
+              <a:t>12/9/18</a:t>
             </a:fld>
             <a:endParaRPr lang="en-US"/>
           </a:p>
@@ -4224,7 +4224,7 @@
           <a:p>
             <a:fld id="{3C486352-6B4E-4843-8C77-57A7D9422E1B}" type="datetimeFigureOut">
               <a:rPr lang="en-US" smtClean="0"/>
-              <a:t>10/20/2018</a:t>
+              <a:t>12/9/18</a:t>
             </a:fld>
             <a:endParaRPr lang="en-US"/>
           </a:p>
@@ -4636,7 +4636,7 @@
           <a:p>
             <a:fld id="{3C486352-6B4E-4843-8C77-57A7D9422E1B}" type="datetimeFigureOut">
               <a:rPr lang="en-US" smtClean="0"/>
-              <a:t>10/20/2018</a:t>
+              <a:t>12/9/18</a:t>
             </a:fld>
             <a:endParaRPr lang="en-US"/>
           </a:p>
@@ -4777,7 +4777,7 @@
           <a:p>
             <a:fld id="{3C486352-6B4E-4843-8C77-57A7D9422E1B}" type="datetimeFigureOut">
               <a:rPr lang="en-US" smtClean="0"/>
-              <a:t>10/20/2018</a:t>
+              <a:t>12/9/18</a:t>
             </a:fld>
             <a:endParaRPr lang="en-US"/>
           </a:p>
@@ -4890,7 +4890,7 @@
           <a:p>
             <a:fld id="{3C486352-6B4E-4843-8C77-57A7D9422E1B}" type="datetimeFigureOut">
               <a:rPr lang="en-US" smtClean="0"/>
-              <a:t>10/20/2018</a:t>
+              <a:t>12/9/18</a:t>
             </a:fld>
             <a:endParaRPr lang="en-US"/>
           </a:p>
@@ -5201,7 +5201,7 @@
           <a:p>
             <a:fld id="{3C486352-6B4E-4843-8C77-57A7D9422E1B}" type="datetimeFigureOut">
               <a:rPr lang="en-US" smtClean="0"/>
-              <a:t>10/20/2018</a:t>
+              <a:t>12/9/18</a:t>
             </a:fld>
             <a:endParaRPr lang="en-US"/>
           </a:p>
@@ -5489,7 +5489,7 @@
           <a:p>
             <a:fld id="{3C486352-6B4E-4843-8C77-57A7D9422E1B}" type="datetimeFigureOut">
               <a:rPr lang="en-US" smtClean="0"/>
-              <a:t>10/20/2018</a:t>
+              <a:t>12/9/18</a:t>
             </a:fld>
             <a:endParaRPr lang="en-US"/>
           </a:p>
@@ -5730,7 +5730,7 @@
           <a:p>
             <a:fld id="{3C486352-6B4E-4843-8C77-57A7D9422E1B}" type="datetimeFigureOut">
               <a:rPr lang="en-US" smtClean="0"/>
-              <a:t>10/20/2018</a:t>
+              <a:t>12/9/18</a:t>
             </a:fld>
             <a:endParaRPr lang="en-US"/>
           </a:p>
@@ -6162,7 +6162,7 @@
           <p:nvPr>
             <p:extLst>
               <p:ext uri="{D42A27DB-BD31-4B8C-83A1-F6EECF244321}">
-                <p14:modId xmlns:p14="http://schemas.microsoft.com/office/powerpoint/2010/main" val="1776126014"/>
+                <p14:modId xmlns:p14="http://schemas.microsoft.com/office/powerpoint/2010/main" val="4175300402"/>
               </p:ext>
             </p:extLst>
           </p:nvPr>
@@ -6240,13 +6240,13 @@
           <p:nvPr>
             <p:extLst>
               <p:ext uri="{D42A27DB-BD31-4B8C-83A1-F6EECF244321}">
-                <p14:modId xmlns:p14="http://schemas.microsoft.com/office/powerpoint/2010/main" val="2046221990"/>
+                <p14:modId xmlns:p14="http://schemas.microsoft.com/office/powerpoint/2010/main" val="578399947"/>
               </p:ext>
             </p:extLst>
           </p:nvPr>
         </p:nvGraphicFramePr>
         <p:xfrm>
-          <a:off x="839294" y="2500313"/>
+          <a:off x="275466" y="2477557"/>
           <a:ext cx="6026080" cy="3228976"/>
         </p:xfrm>
         <a:graphic>
@@ -6269,7 +6269,7 @@
         </p:nvSpPr>
         <p:spPr>
           <a:xfrm>
-            <a:off x="2980754" y="5781466"/>
+            <a:off x="2416926" y="5758710"/>
             <a:ext cx="300082" cy="276999"/>
           </a:xfrm>
           <a:prstGeom prst="rect">
@@ -6300,6 +6300,55 @@
               <a:t></a:t>
             </a:r>
             <a:endParaRPr lang="en-US" sz="1200" dirty="0"/>
+          </a:p>
+        </p:txBody>
+      </p:sp>
+      <p:sp>
+        <p:nvSpPr>
+          <p:cNvPr id="2" name="TextBox 1">
+            <a:extLst>
+              <a:ext uri="{FF2B5EF4-FFF2-40B4-BE49-F238E27FC236}">
+                <a16:creationId xmlns:a16="http://schemas.microsoft.com/office/drawing/2014/main" id="{0A65EBC8-136E-0347-B192-33D3CFC71F41}"/>
+              </a:ext>
+            </a:extLst>
+          </p:cNvPr>
+          <p:cNvSpPr txBox="1"/>
+          <p:nvPr/>
+        </p:nvSpPr>
+        <p:spPr>
+          <a:xfrm>
+            <a:off x="6994937" y="3953545"/>
+            <a:ext cx="338554" cy="276999"/>
+          </a:xfrm>
+          <a:prstGeom prst="rect">
+            <a:avLst/>
+          </a:prstGeom>
+          <a:noFill/>
+        </p:spPr>
+        <p:txBody>
+          <a:bodyPr wrap="none" rtlCol="0">
+            <a:spAutoFit/>
+          </a:bodyPr>
+          <a:lstStyle/>
+          <a:p>
+            <a:r>
+              <a:rPr lang="en-US" sz="1200" dirty="0" err="1">
+                <a:latin typeface="Arial" panose="020B0604020202020204" pitchFamily="34" charset="0"/>
+                <a:cs typeface="Arial" panose="020B0604020202020204" pitchFamily="34" charset="0"/>
+              </a:rPr>
+              <a:t>X</a:t>
+            </a:r>
+            <a:r>
+              <a:rPr lang="en-US" sz="1200" baseline="-25000" dirty="0" err="1">
+                <a:latin typeface="Arial" panose="020B0604020202020204" pitchFamily="34" charset="0"/>
+                <a:cs typeface="Arial" panose="020B0604020202020204" pitchFamily="34" charset="0"/>
+              </a:rPr>
+              <a:t>c</a:t>
+            </a:r>
+            <a:endParaRPr lang="en-US" sz="1200" dirty="0">
+              <a:latin typeface="Arial" panose="020B0604020202020204" pitchFamily="34" charset="0"/>
+              <a:cs typeface="Arial" panose="020B0604020202020204" pitchFamily="34" charset="0"/>
+            </a:endParaRPr>
           </a:p>
         </p:txBody>
       </p:sp>

</xml_diff>